<commit_message>
updated lecture slides for lecture 6
</commit_message>
<xml_diff>
--- a/lecture_06/API Development and Intermediate MongoDB.pptx
+++ b/lecture_06/API Development and Intermediate MongoDB.pptx
@@ -297,7 +297,7 @@
           <a:p>
             <a:fld id="{DD7909B4-0034-084A-82BA-DE59354427DE}" type="datetime1">
               <a:rPr lang="en-US" smtClean="0"/>
-              <a:t>3/1/20</a:t>
+              <a:t>3/2/20</a:t>
             </a:fld>
             <a:endParaRPr lang="en-US"/>
           </a:p>
@@ -463,7 +463,7 @@
           <a:p>
             <a:fld id="{9BAEE3B6-A6CF-1B42-910E-8E290E739F0F}" type="datetime1">
               <a:rPr lang="en-US" smtClean="0"/>
-              <a:t>3/1/20</a:t>
+              <a:t>3/2/20</a:t>
             </a:fld>
             <a:endParaRPr lang="en-US"/>
           </a:p>
@@ -29007,911 +29007,6 @@
               <a:t>to add the post to the DB :</a:t>
             </a:r>
           </a:p>
-          <a:p>
-            <a:pPr marL="0" indent="0">
-              <a:spcAft>
-                <a:spcPts val="0"/>
-              </a:spcAft>
-              <a:buNone/>
-            </a:pPr>
-            <a:endParaRPr lang="en-US" b="1" i="1" dirty="0">
-              <a:solidFill>
-                <a:srgbClr val="001080"/>
-              </a:solidFill>
-              <a:latin typeface="Courier New" panose="02070309020205020404" pitchFamily="49" charset="0"/>
-              <a:cs typeface="Courier New" panose="02070309020205020404" pitchFamily="49" charset="0"/>
-            </a:endParaRPr>
-          </a:p>
-          <a:p>
-            <a:pPr marL="0" indent="0">
-              <a:spcAft>
-                <a:spcPts val="0"/>
-              </a:spcAft>
-              <a:buNone/>
-            </a:pPr>
-            <a:r>
-              <a:rPr lang="en-US" b="1" i="1" dirty="0" err="1">
-                <a:solidFill>
-                  <a:srgbClr val="001080"/>
-                </a:solidFill>
-                <a:latin typeface="Courier New" panose="02070309020205020404" pitchFamily="49" charset="0"/>
-                <a:cs typeface="Courier New" panose="02070309020205020404" pitchFamily="49" charset="0"/>
-              </a:rPr>
-              <a:t>router</a:t>
-            </a:r>
-            <a:r>
-              <a:rPr lang="en-US" b="1" i="1" dirty="0" err="1">
-                <a:solidFill>
-                  <a:srgbClr val="000000"/>
-                </a:solidFill>
-                <a:latin typeface="Courier New" panose="02070309020205020404" pitchFamily="49" charset="0"/>
-                <a:cs typeface="Courier New" panose="02070309020205020404" pitchFamily="49" charset="0"/>
-              </a:rPr>
-              <a:t>.</a:t>
-            </a:r>
-            <a:r>
-              <a:rPr lang="en-US" b="1" i="1" dirty="0" err="1">
-                <a:solidFill>
-                  <a:srgbClr val="795E26"/>
-                </a:solidFill>
-                <a:latin typeface="Courier New" panose="02070309020205020404" pitchFamily="49" charset="0"/>
-                <a:cs typeface="Courier New" panose="02070309020205020404" pitchFamily="49" charset="0"/>
-              </a:rPr>
-              <a:t>post</a:t>
-            </a:r>
-            <a:r>
-              <a:rPr lang="en-US" b="1" i="1" dirty="0">
-                <a:solidFill>
-                  <a:srgbClr val="000000"/>
-                </a:solidFill>
-                <a:latin typeface="Courier New" panose="02070309020205020404" pitchFamily="49" charset="0"/>
-                <a:cs typeface="Courier New" panose="02070309020205020404" pitchFamily="49" charset="0"/>
-              </a:rPr>
-              <a:t>(</a:t>
-            </a:r>
-            <a:r>
-              <a:rPr lang="en-US" b="1" i="1" dirty="0">
-                <a:solidFill>
-                  <a:srgbClr val="A31515"/>
-                </a:solidFill>
-                <a:latin typeface="Courier New" panose="02070309020205020404" pitchFamily="49" charset="0"/>
-                <a:cs typeface="Courier New" panose="02070309020205020404" pitchFamily="49" charset="0"/>
-              </a:rPr>
-              <a:t>'/'</a:t>
-            </a:r>
-            <a:r>
-              <a:rPr lang="en-US" b="1" i="1" dirty="0">
-                <a:solidFill>
-                  <a:srgbClr val="000000"/>
-                </a:solidFill>
-                <a:latin typeface="Courier New" panose="02070309020205020404" pitchFamily="49" charset="0"/>
-                <a:cs typeface="Courier New" panose="02070309020205020404" pitchFamily="49" charset="0"/>
-              </a:rPr>
-              <a:t>, </a:t>
-            </a:r>
-            <a:r>
-              <a:rPr lang="en-US" b="1" i="1" dirty="0">
-                <a:solidFill>
-                  <a:srgbClr val="0000FF"/>
-                </a:solidFill>
-                <a:latin typeface="Courier New" panose="02070309020205020404" pitchFamily="49" charset="0"/>
-                <a:cs typeface="Courier New" panose="02070309020205020404" pitchFamily="49" charset="0"/>
-              </a:rPr>
-              <a:t>async</a:t>
-            </a:r>
-            <a:r>
-              <a:rPr lang="en-US" b="1" i="1" dirty="0">
-                <a:solidFill>
-                  <a:srgbClr val="000000"/>
-                </a:solidFill>
-                <a:latin typeface="Courier New" panose="02070309020205020404" pitchFamily="49" charset="0"/>
-                <a:cs typeface="Courier New" panose="02070309020205020404" pitchFamily="49" charset="0"/>
-              </a:rPr>
-              <a:t> (</a:t>
-            </a:r>
-            <a:r>
-              <a:rPr lang="en-US" b="1" i="1" dirty="0">
-                <a:solidFill>
-                  <a:srgbClr val="001080"/>
-                </a:solidFill>
-                <a:latin typeface="Courier New" panose="02070309020205020404" pitchFamily="49" charset="0"/>
-                <a:cs typeface="Courier New" panose="02070309020205020404" pitchFamily="49" charset="0"/>
-              </a:rPr>
-              <a:t>req</a:t>
-            </a:r>
-            <a:r>
-              <a:rPr lang="en-US" b="1" i="1" dirty="0">
-                <a:solidFill>
-                  <a:srgbClr val="000000"/>
-                </a:solidFill>
-                <a:latin typeface="Courier New" panose="02070309020205020404" pitchFamily="49" charset="0"/>
-                <a:cs typeface="Courier New" panose="02070309020205020404" pitchFamily="49" charset="0"/>
-              </a:rPr>
-              <a:t>, </a:t>
-            </a:r>
-            <a:r>
-              <a:rPr lang="en-US" b="1" i="1" dirty="0">
-                <a:solidFill>
-                  <a:srgbClr val="001080"/>
-                </a:solidFill>
-                <a:latin typeface="Courier New" panose="02070309020205020404" pitchFamily="49" charset="0"/>
-                <a:cs typeface="Courier New" panose="02070309020205020404" pitchFamily="49" charset="0"/>
-              </a:rPr>
-              <a:t>res</a:t>
-            </a:r>
-            <a:r>
-              <a:rPr lang="en-US" b="1" i="1" dirty="0">
-                <a:solidFill>
-                  <a:srgbClr val="000000"/>
-                </a:solidFill>
-                <a:latin typeface="Courier New" panose="02070309020205020404" pitchFamily="49" charset="0"/>
-                <a:cs typeface="Courier New" panose="02070309020205020404" pitchFamily="49" charset="0"/>
-              </a:rPr>
-              <a:t>) </a:t>
-            </a:r>
-            <a:r>
-              <a:rPr lang="en-US" b="1" i="1" dirty="0">
-                <a:solidFill>
-                  <a:srgbClr val="0000FF"/>
-                </a:solidFill>
-                <a:latin typeface="Courier New" panose="02070309020205020404" pitchFamily="49" charset="0"/>
-                <a:cs typeface="Courier New" panose="02070309020205020404" pitchFamily="49" charset="0"/>
-              </a:rPr>
-              <a:t>=&gt;</a:t>
-            </a:r>
-            <a:r>
-              <a:rPr lang="en-US" b="1" i="1" dirty="0">
-                <a:solidFill>
-                  <a:srgbClr val="000000"/>
-                </a:solidFill>
-                <a:latin typeface="Courier New" panose="02070309020205020404" pitchFamily="49" charset="0"/>
-                <a:cs typeface="Courier New" panose="02070309020205020404" pitchFamily="49" charset="0"/>
-              </a:rPr>
-              <a:t> {</a:t>
-            </a:r>
-          </a:p>
-          <a:p>
-            <a:pPr marL="0" indent="0">
-              <a:spcAft>
-                <a:spcPts val="0"/>
-              </a:spcAft>
-              <a:buNone/>
-            </a:pPr>
-            <a:r>
-              <a:rPr lang="en-US" b="1" i="1" dirty="0">
-                <a:solidFill>
-                  <a:srgbClr val="0000FF"/>
-                </a:solidFill>
-                <a:latin typeface="Courier New" panose="02070309020205020404" pitchFamily="49" charset="0"/>
-                <a:cs typeface="Courier New" panose="02070309020205020404" pitchFamily="49" charset="0"/>
-              </a:rPr>
-              <a:t>  const</a:t>
-            </a:r>
-            <a:r>
-              <a:rPr lang="en-US" b="1" i="1" dirty="0">
-                <a:solidFill>
-                  <a:srgbClr val="000000"/>
-                </a:solidFill>
-                <a:latin typeface="Courier New" panose="02070309020205020404" pitchFamily="49" charset="0"/>
-                <a:cs typeface="Courier New" panose="02070309020205020404" pitchFamily="49" charset="0"/>
-              </a:rPr>
-              <a:t> </a:t>
-            </a:r>
-            <a:r>
-              <a:rPr lang="en-US" b="1" i="1" dirty="0" err="1">
-                <a:solidFill>
-                  <a:srgbClr val="001080"/>
-                </a:solidFill>
-                <a:latin typeface="Courier New" panose="02070309020205020404" pitchFamily="49" charset="0"/>
-                <a:cs typeface="Courier New" panose="02070309020205020404" pitchFamily="49" charset="0"/>
-              </a:rPr>
-              <a:t>blogPostData</a:t>
-            </a:r>
-            <a:r>
-              <a:rPr lang="en-US" b="1" i="1" dirty="0">
-                <a:solidFill>
-                  <a:srgbClr val="000000"/>
-                </a:solidFill>
-                <a:latin typeface="Courier New" panose="02070309020205020404" pitchFamily="49" charset="0"/>
-                <a:cs typeface="Courier New" panose="02070309020205020404" pitchFamily="49" charset="0"/>
-              </a:rPr>
-              <a:t> = </a:t>
-            </a:r>
-            <a:r>
-              <a:rPr lang="en-US" b="1" i="1" dirty="0" err="1">
-                <a:solidFill>
-                  <a:srgbClr val="001080"/>
-                </a:solidFill>
-                <a:latin typeface="Courier New" panose="02070309020205020404" pitchFamily="49" charset="0"/>
-                <a:cs typeface="Courier New" panose="02070309020205020404" pitchFamily="49" charset="0"/>
-              </a:rPr>
-              <a:t>req</a:t>
-            </a:r>
-            <a:r>
-              <a:rPr lang="en-US" b="1" i="1" dirty="0" err="1">
-                <a:solidFill>
-                  <a:srgbClr val="000000"/>
-                </a:solidFill>
-                <a:latin typeface="Courier New" panose="02070309020205020404" pitchFamily="49" charset="0"/>
-                <a:cs typeface="Courier New" panose="02070309020205020404" pitchFamily="49" charset="0"/>
-              </a:rPr>
-              <a:t>.</a:t>
-            </a:r>
-            <a:r>
-              <a:rPr lang="en-US" b="1" i="1" dirty="0" err="1">
-                <a:solidFill>
-                  <a:srgbClr val="001080"/>
-                </a:solidFill>
-                <a:latin typeface="Courier New" panose="02070309020205020404" pitchFamily="49" charset="0"/>
-                <a:cs typeface="Courier New" panose="02070309020205020404" pitchFamily="49" charset="0"/>
-              </a:rPr>
-              <a:t>body</a:t>
-            </a:r>
-            <a:r>
-              <a:rPr lang="en-US" b="1" i="1" dirty="0">
-                <a:solidFill>
-                  <a:srgbClr val="000000"/>
-                </a:solidFill>
-                <a:latin typeface="Courier New" panose="02070309020205020404" pitchFamily="49" charset="0"/>
-                <a:cs typeface="Courier New" panose="02070309020205020404" pitchFamily="49" charset="0"/>
-              </a:rPr>
-              <a:t>;</a:t>
-            </a:r>
-          </a:p>
-          <a:p>
-            <a:pPr marL="0" indent="0">
-              <a:spcAft>
-                <a:spcPts val="0"/>
-              </a:spcAft>
-              <a:buNone/>
-            </a:pPr>
-            <a:r>
-              <a:rPr lang="en-US" b="1" i="1" dirty="0">
-                <a:solidFill>
-                  <a:srgbClr val="AF00DB"/>
-                </a:solidFill>
-                <a:latin typeface="Courier New" panose="02070309020205020404" pitchFamily="49" charset="0"/>
-                <a:cs typeface="Courier New" panose="02070309020205020404" pitchFamily="49" charset="0"/>
-              </a:rPr>
-              <a:t>  try</a:t>
-            </a:r>
-            <a:r>
-              <a:rPr lang="en-US" b="1" i="1" dirty="0">
-                <a:solidFill>
-                  <a:srgbClr val="000000"/>
-                </a:solidFill>
-                <a:latin typeface="Courier New" panose="02070309020205020404" pitchFamily="49" charset="0"/>
-                <a:cs typeface="Courier New" panose="02070309020205020404" pitchFamily="49" charset="0"/>
-              </a:rPr>
-              <a:t> {</a:t>
-            </a:r>
-          </a:p>
-          <a:p>
-            <a:pPr marL="0" indent="0">
-              <a:spcAft>
-                <a:spcPts val="0"/>
-              </a:spcAft>
-              <a:buNone/>
-            </a:pPr>
-            <a:r>
-              <a:rPr lang="en-US" b="1" i="1" dirty="0">
-                <a:solidFill>
-                  <a:srgbClr val="0000FF"/>
-                </a:solidFill>
-                <a:latin typeface="Courier New" panose="02070309020205020404" pitchFamily="49" charset="0"/>
-                <a:cs typeface="Courier New" panose="02070309020205020404" pitchFamily="49" charset="0"/>
-              </a:rPr>
-              <a:t>    const</a:t>
-            </a:r>
-            <a:r>
-              <a:rPr lang="en-US" b="1" i="1" dirty="0">
-                <a:solidFill>
-                  <a:srgbClr val="000000"/>
-                </a:solidFill>
-                <a:latin typeface="Courier New" panose="02070309020205020404" pitchFamily="49" charset="0"/>
-                <a:cs typeface="Courier New" panose="02070309020205020404" pitchFamily="49" charset="0"/>
-              </a:rPr>
-              <a:t> {</a:t>
-            </a:r>
-            <a:r>
-              <a:rPr lang="en-US" b="1" i="1" dirty="0">
-                <a:solidFill>
-                  <a:srgbClr val="001080"/>
-                </a:solidFill>
-                <a:latin typeface="Courier New" panose="02070309020205020404" pitchFamily="49" charset="0"/>
-                <a:cs typeface="Courier New" panose="02070309020205020404" pitchFamily="49" charset="0"/>
-              </a:rPr>
-              <a:t>title</a:t>
-            </a:r>
-            <a:r>
-              <a:rPr lang="en-US" b="1" i="1" dirty="0">
-                <a:solidFill>
-                  <a:srgbClr val="000000"/>
-                </a:solidFill>
-                <a:latin typeface="Courier New" panose="02070309020205020404" pitchFamily="49" charset="0"/>
-                <a:cs typeface="Courier New" panose="02070309020205020404" pitchFamily="49" charset="0"/>
-              </a:rPr>
-              <a:t>, </a:t>
-            </a:r>
-            <a:r>
-              <a:rPr lang="en-US" b="1" i="1" dirty="0">
-                <a:solidFill>
-                  <a:srgbClr val="001080"/>
-                </a:solidFill>
-                <a:latin typeface="Courier New" panose="02070309020205020404" pitchFamily="49" charset="0"/>
-                <a:cs typeface="Courier New" panose="02070309020205020404" pitchFamily="49" charset="0"/>
-              </a:rPr>
-              <a:t>body</a:t>
-            </a:r>
-            <a:r>
-              <a:rPr lang="en-US" b="1" i="1" dirty="0">
-                <a:solidFill>
-                  <a:srgbClr val="000000"/>
-                </a:solidFill>
-                <a:latin typeface="Courier New" panose="02070309020205020404" pitchFamily="49" charset="0"/>
-                <a:cs typeface="Courier New" panose="02070309020205020404" pitchFamily="49" charset="0"/>
-              </a:rPr>
-              <a:t>, </a:t>
-            </a:r>
-            <a:r>
-              <a:rPr lang="en-US" b="1" i="1" dirty="0">
-                <a:solidFill>
-                  <a:srgbClr val="001080"/>
-                </a:solidFill>
-                <a:latin typeface="Courier New" panose="02070309020205020404" pitchFamily="49" charset="0"/>
-                <a:cs typeface="Courier New" panose="02070309020205020404" pitchFamily="49" charset="0"/>
-              </a:rPr>
-              <a:t>tags</a:t>
-            </a:r>
-            <a:r>
-              <a:rPr lang="en-US" b="1" i="1" dirty="0">
-                <a:solidFill>
-                  <a:srgbClr val="000000"/>
-                </a:solidFill>
-                <a:latin typeface="Courier New" panose="02070309020205020404" pitchFamily="49" charset="0"/>
-                <a:cs typeface="Courier New" panose="02070309020205020404" pitchFamily="49" charset="0"/>
-              </a:rPr>
-              <a:t>, </a:t>
-            </a:r>
-            <a:r>
-              <a:rPr lang="en-US" b="1" i="1" dirty="0" err="1">
-                <a:solidFill>
-                  <a:srgbClr val="001080"/>
-                </a:solidFill>
-                <a:latin typeface="Courier New" panose="02070309020205020404" pitchFamily="49" charset="0"/>
-                <a:cs typeface="Courier New" panose="02070309020205020404" pitchFamily="49" charset="0"/>
-              </a:rPr>
-              <a:t>posterId</a:t>
-            </a:r>
-            <a:r>
-              <a:rPr lang="en-US" b="1" i="1" dirty="0">
-                <a:solidFill>
-                  <a:srgbClr val="000000"/>
-                </a:solidFill>
-                <a:latin typeface="Courier New" panose="02070309020205020404" pitchFamily="49" charset="0"/>
-                <a:cs typeface="Courier New" panose="02070309020205020404" pitchFamily="49" charset="0"/>
-              </a:rPr>
-              <a:t>} = </a:t>
-            </a:r>
-            <a:r>
-              <a:rPr lang="en-US" b="1" i="1" dirty="0" err="1">
-                <a:solidFill>
-                  <a:srgbClr val="001080"/>
-                </a:solidFill>
-                <a:latin typeface="Courier New" panose="02070309020205020404" pitchFamily="49" charset="0"/>
-                <a:cs typeface="Courier New" panose="02070309020205020404" pitchFamily="49" charset="0"/>
-              </a:rPr>
-              <a:t>blogPostData</a:t>
-            </a:r>
-            <a:r>
-              <a:rPr lang="en-US" b="1" i="1" dirty="0">
-                <a:solidFill>
-                  <a:srgbClr val="000000"/>
-                </a:solidFill>
-                <a:latin typeface="Courier New" panose="02070309020205020404" pitchFamily="49" charset="0"/>
-                <a:cs typeface="Courier New" panose="02070309020205020404" pitchFamily="49" charset="0"/>
-              </a:rPr>
-              <a:t>;</a:t>
-            </a:r>
-          </a:p>
-          <a:p>
-            <a:pPr marL="0" indent="0">
-              <a:spcAft>
-                <a:spcPts val="0"/>
-              </a:spcAft>
-              <a:buNone/>
-            </a:pPr>
-            <a:r>
-              <a:rPr lang="en-US" b="1" i="1" dirty="0">
-                <a:solidFill>
-                  <a:srgbClr val="0000FF"/>
-                </a:solidFill>
-                <a:latin typeface="Courier New" panose="02070309020205020404" pitchFamily="49" charset="0"/>
-                <a:cs typeface="Courier New" panose="02070309020205020404" pitchFamily="49" charset="0"/>
-              </a:rPr>
-              <a:t>    const</a:t>
-            </a:r>
-            <a:r>
-              <a:rPr lang="en-US" b="1" i="1" dirty="0">
-                <a:solidFill>
-                  <a:srgbClr val="000000"/>
-                </a:solidFill>
-                <a:latin typeface="Courier New" panose="02070309020205020404" pitchFamily="49" charset="0"/>
-                <a:cs typeface="Courier New" panose="02070309020205020404" pitchFamily="49" charset="0"/>
-              </a:rPr>
-              <a:t> </a:t>
-            </a:r>
-            <a:r>
-              <a:rPr lang="en-US" b="1" i="1" dirty="0" err="1">
-                <a:solidFill>
-                  <a:srgbClr val="001080"/>
-                </a:solidFill>
-                <a:latin typeface="Courier New" panose="02070309020205020404" pitchFamily="49" charset="0"/>
-                <a:cs typeface="Courier New" panose="02070309020205020404" pitchFamily="49" charset="0"/>
-              </a:rPr>
-              <a:t>newPost</a:t>
-            </a:r>
-            <a:r>
-              <a:rPr lang="en-US" b="1" i="1" dirty="0">
-                <a:solidFill>
-                  <a:srgbClr val="000000"/>
-                </a:solidFill>
-                <a:latin typeface="Courier New" panose="02070309020205020404" pitchFamily="49" charset="0"/>
-                <a:cs typeface="Courier New" panose="02070309020205020404" pitchFamily="49" charset="0"/>
-              </a:rPr>
-              <a:t> = </a:t>
-            </a:r>
-            <a:r>
-              <a:rPr lang="en-US" b="1" i="1" dirty="0">
-                <a:solidFill>
-                  <a:srgbClr val="AF00DB"/>
-                </a:solidFill>
-                <a:latin typeface="Courier New" panose="02070309020205020404" pitchFamily="49" charset="0"/>
-                <a:cs typeface="Courier New" panose="02070309020205020404" pitchFamily="49" charset="0"/>
-              </a:rPr>
-              <a:t>await</a:t>
-            </a:r>
-            <a:r>
-              <a:rPr lang="en-US" b="1" i="1" dirty="0">
-                <a:solidFill>
-                  <a:srgbClr val="000000"/>
-                </a:solidFill>
-                <a:latin typeface="Courier New" panose="02070309020205020404" pitchFamily="49" charset="0"/>
-                <a:cs typeface="Courier New" panose="02070309020205020404" pitchFamily="49" charset="0"/>
-              </a:rPr>
-              <a:t> </a:t>
-            </a:r>
-            <a:r>
-              <a:rPr lang="en-US" b="1" i="1" dirty="0" err="1">
-                <a:solidFill>
-                  <a:srgbClr val="001080"/>
-                </a:solidFill>
-                <a:latin typeface="Courier New" panose="02070309020205020404" pitchFamily="49" charset="0"/>
-                <a:cs typeface="Courier New" panose="02070309020205020404" pitchFamily="49" charset="0"/>
-              </a:rPr>
-              <a:t>postData</a:t>
-            </a:r>
-            <a:r>
-              <a:rPr lang="en-US" b="1" i="1" dirty="0" err="1">
-                <a:solidFill>
-                  <a:srgbClr val="000000"/>
-                </a:solidFill>
-                <a:latin typeface="Courier New" panose="02070309020205020404" pitchFamily="49" charset="0"/>
-                <a:cs typeface="Courier New" panose="02070309020205020404" pitchFamily="49" charset="0"/>
-              </a:rPr>
-              <a:t>.</a:t>
-            </a:r>
-            <a:r>
-              <a:rPr lang="en-US" b="1" i="1" dirty="0" err="1">
-                <a:solidFill>
-                  <a:srgbClr val="795E26"/>
-                </a:solidFill>
-                <a:latin typeface="Courier New" panose="02070309020205020404" pitchFamily="49" charset="0"/>
-                <a:cs typeface="Courier New" panose="02070309020205020404" pitchFamily="49" charset="0"/>
-              </a:rPr>
-              <a:t>addPost</a:t>
-            </a:r>
-            <a:r>
-              <a:rPr lang="en-US" b="1" i="1" dirty="0">
-                <a:solidFill>
-                  <a:srgbClr val="000000"/>
-                </a:solidFill>
-                <a:latin typeface="Courier New" panose="02070309020205020404" pitchFamily="49" charset="0"/>
-                <a:cs typeface="Courier New" panose="02070309020205020404" pitchFamily="49" charset="0"/>
-              </a:rPr>
-              <a:t>(</a:t>
-            </a:r>
-            <a:r>
-              <a:rPr lang="en-US" b="1" i="1" dirty="0">
-                <a:solidFill>
-                  <a:srgbClr val="001080"/>
-                </a:solidFill>
-                <a:latin typeface="Courier New" panose="02070309020205020404" pitchFamily="49" charset="0"/>
-                <a:cs typeface="Courier New" panose="02070309020205020404" pitchFamily="49" charset="0"/>
-              </a:rPr>
-              <a:t>title</a:t>
-            </a:r>
-            <a:r>
-              <a:rPr lang="en-US" b="1" i="1" dirty="0">
-                <a:solidFill>
-                  <a:srgbClr val="000000"/>
-                </a:solidFill>
-                <a:latin typeface="Courier New" panose="02070309020205020404" pitchFamily="49" charset="0"/>
-                <a:cs typeface="Courier New" panose="02070309020205020404" pitchFamily="49" charset="0"/>
-              </a:rPr>
-              <a:t>, </a:t>
-            </a:r>
-            <a:r>
-              <a:rPr lang="en-US" b="1" i="1" dirty="0">
-                <a:solidFill>
-                  <a:srgbClr val="001080"/>
-                </a:solidFill>
-                <a:latin typeface="Courier New" panose="02070309020205020404" pitchFamily="49" charset="0"/>
-                <a:cs typeface="Courier New" panose="02070309020205020404" pitchFamily="49" charset="0"/>
-              </a:rPr>
-              <a:t>body</a:t>
-            </a:r>
-            <a:r>
-              <a:rPr lang="en-US" b="1" i="1" dirty="0">
-                <a:solidFill>
-                  <a:srgbClr val="000000"/>
-                </a:solidFill>
-                <a:latin typeface="Courier New" panose="02070309020205020404" pitchFamily="49" charset="0"/>
-                <a:cs typeface="Courier New" panose="02070309020205020404" pitchFamily="49" charset="0"/>
-              </a:rPr>
-              <a:t>, </a:t>
-            </a:r>
-            <a:r>
-              <a:rPr lang="en-US" b="1" i="1" dirty="0">
-                <a:solidFill>
-                  <a:srgbClr val="001080"/>
-                </a:solidFill>
-                <a:latin typeface="Courier New" panose="02070309020205020404" pitchFamily="49" charset="0"/>
-                <a:cs typeface="Courier New" panose="02070309020205020404" pitchFamily="49" charset="0"/>
-              </a:rPr>
-              <a:t>tags</a:t>
-            </a:r>
-            <a:r>
-              <a:rPr lang="en-US" b="1" i="1" dirty="0">
-                <a:solidFill>
-                  <a:srgbClr val="000000"/>
-                </a:solidFill>
-                <a:latin typeface="Courier New" panose="02070309020205020404" pitchFamily="49" charset="0"/>
-                <a:cs typeface="Courier New" panose="02070309020205020404" pitchFamily="49" charset="0"/>
-              </a:rPr>
-              <a:t>, </a:t>
-            </a:r>
-            <a:r>
-              <a:rPr lang="en-US" b="1" i="1" dirty="0" err="1">
-                <a:solidFill>
-                  <a:srgbClr val="001080"/>
-                </a:solidFill>
-                <a:latin typeface="Courier New" panose="02070309020205020404" pitchFamily="49" charset="0"/>
-                <a:cs typeface="Courier New" panose="02070309020205020404" pitchFamily="49" charset="0"/>
-              </a:rPr>
-              <a:t>posterId</a:t>
-            </a:r>
-            <a:r>
-              <a:rPr lang="en-US" b="1" i="1" dirty="0">
-                <a:solidFill>
-                  <a:srgbClr val="000000"/>
-                </a:solidFill>
-                <a:latin typeface="Courier New" panose="02070309020205020404" pitchFamily="49" charset="0"/>
-                <a:cs typeface="Courier New" panose="02070309020205020404" pitchFamily="49" charset="0"/>
-              </a:rPr>
-              <a:t>);</a:t>
-            </a:r>
-          </a:p>
-          <a:p>
-            <a:pPr marL="0" indent="0">
-              <a:spcAft>
-                <a:spcPts val="0"/>
-              </a:spcAft>
-              <a:buNone/>
-            </a:pPr>
-            <a:r>
-              <a:rPr lang="en-US" b="1" i="1" dirty="0">
-                <a:solidFill>
-                  <a:srgbClr val="001080"/>
-                </a:solidFill>
-                <a:latin typeface="Courier New" panose="02070309020205020404" pitchFamily="49" charset="0"/>
-                <a:cs typeface="Courier New" panose="02070309020205020404" pitchFamily="49" charset="0"/>
-              </a:rPr>
-              <a:t>    </a:t>
-            </a:r>
-            <a:r>
-              <a:rPr lang="en-US" b="1" i="1" dirty="0" err="1">
-                <a:solidFill>
-                  <a:srgbClr val="001080"/>
-                </a:solidFill>
-                <a:latin typeface="Courier New" panose="02070309020205020404" pitchFamily="49" charset="0"/>
-                <a:cs typeface="Courier New" panose="02070309020205020404" pitchFamily="49" charset="0"/>
-              </a:rPr>
-              <a:t>res</a:t>
-            </a:r>
-            <a:r>
-              <a:rPr lang="en-US" b="1" i="1" dirty="0" err="1">
-                <a:solidFill>
-                  <a:srgbClr val="000000"/>
-                </a:solidFill>
-                <a:latin typeface="Courier New" panose="02070309020205020404" pitchFamily="49" charset="0"/>
-                <a:cs typeface="Courier New" panose="02070309020205020404" pitchFamily="49" charset="0"/>
-              </a:rPr>
-              <a:t>.</a:t>
-            </a:r>
-            <a:r>
-              <a:rPr lang="en-US" b="1" i="1" dirty="0" err="1">
-                <a:solidFill>
-                  <a:srgbClr val="795E26"/>
-                </a:solidFill>
-                <a:latin typeface="Courier New" panose="02070309020205020404" pitchFamily="49" charset="0"/>
-                <a:cs typeface="Courier New" panose="02070309020205020404" pitchFamily="49" charset="0"/>
-              </a:rPr>
-              <a:t>json</a:t>
-            </a:r>
-            <a:r>
-              <a:rPr lang="en-US" b="1" i="1" dirty="0">
-                <a:solidFill>
-                  <a:srgbClr val="000000"/>
-                </a:solidFill>
-                <a:latin typeface="Courier New" panose="02070309020205020404" pitchFamily="49" charset="0"/>
-                <a:cs typeface="Courier New" panose="02070309020205020404" pitchFamily="49" charset="0"/>
-              </a:rPr>
-              <a:t>(</a:t>
-            </a:r>
-            <a:r>
-              <a:rPr lang="en-US" b="1" i="1" dirty="0" err="1">
-                <a:solidFill>
-                  <a:srgbClr val="001080"/>
-                </a:solidFill>
-                <a:latin typeface="Courier New" panose="02070309020205020404" pitchFamily="49" charset="0"/>
-                <a:cs typeface="Courier New" panose="02070309020205020404" pitchFamily="49" charset="0"/>
-              </a:rPr>
-              <a:t>newPost</a:t>
-            </a:r>
-            <a:r>
-              <a:rPr lang="en-US" b="1" i="1" dirty="0">
-                <a:solidFill>
-                  <a:srgbClr val="000000"/>
-                </a:solidFill>
-                <a:latin typeface="Courier New" panose="02070309020205020404" pitchFamily="49" charset="0"/>
-                <a:cs typeface="Courier New" panose="02070309020205020404" pitchFamily="49" charset="0"/>
-              </a:rPr>
-              <a:t>);</a:t>
-            </a:r>
-          </a:p>
-          <a:p>
-            <a:pPr marL="0" indent="0">
-              <a:spcAft>
-                <a:spcPts val="0"/>
-              </a:spcAft>
-              <a:buNone/>
-            </a:pPr>
-            <a:r>
-              <a:rPr lang="en-US" b="1" i="1" dirty="0">
-                <a:solidFill>
-                  <a:srgbClr val="000000"/>
-                </a:solidFill>
-                <a:latin typeface="Courier New" panose="02070309020205020404" pitchFamily="49" charset="0"/>
-                <a:cs typeface="Courier New" panose="02070309020205020404" pitchFamily="49" charset="0"/>
-              </a:rPr>
-              <a:t>  } </a:t>
-            </a:r>
-            <a:r>
-              <a:rPr lang="en-US" b="1" i="1" dirty="0">
-                <a:solidFill>
-                  <a:srgbClr val="AF00DB"/>
-                </a:solidFill>
-                <a:latin typeface="Courier New" panose="02070309020205020404" pitchFamily="49" charset="0"/>
-                <a:cs typeface="Courier New" panose="02070309020205020404" pitchFamily="49" charset="0"/>
-              </a:rPr>
-              <a:t>catch</a:t>
-            </a:r>
-            <a:r>
-              <a:rPr lang="en-US" b="1" i="1" dirty="0">
-                <a:solidFill>
-                  <a:srgbClr val="000000"/>
-                </a:solidFill>
-                <a:latin typeface="Courier New" panose="02070309020205020404" pitchFamily="49" charset="0"/>
-                <a:cs typeface="Courier New" panose="02070309020205020404" pitchFamily="49" charset="0"/>
-              </a:rPr>
-              <a:t> (</a:t>
-            </a:r>
-            <a:r>
-              <a:rPr lang="en-US" b="1" i="1" dirty="0">
-                <a:solidFill>
-                  <a:srgbClr val="001080"/>
-                </a:solidFill>
-                <a:latin typeface="Courier New" panose="02070309020205020404" pitchFamily="49" charset="0"/>
-                <a:cs typeface="Courier New" panose="02070309020205020404" pitchFamily="49" charset="0"/>
-              </a:rPr>
-              <a:t>e</a:t>
-            </a:r>
-            <a:r>
-              <a:rPr lang="en-US" b="1" i="1" dirty="0">
-                <a:solidFill>
-                  <a:srgbClr val="000000"/>
-                </a:solidFill>
-                <a:latin typeface="Courier New" panose="02070309020205020404" pitchFamily="49" charset="0"/>
-                <a:cs typeface="Courier New" panose="02070309020205020404" pitchFamily="49" charset="0"/>
-              </a:rPr>
-              <a:t>) {</a:t>
-            </a:r>
-          </a:p>
-          <a:p>
-            <a:pPr marL="0" indent="0">
-              <a:spcAft>
-                <a:spcPts val="0"/>
-              </a:spcAft>
-              <a:buNone/>
-            </a:pPr>
-            <a:r>
-              <a:rPr lang="en-US" b="1" i="1" dirty="0">
-                <a:solidFill>
-                  <a:srgbClr val="001080"/>
-                </a:solidFill>
-                <a:latin typeface="Courier New" panose="02070309020205020404" pitchFamily="49" charset="0"/>
-                <a:cs typeface="Courier New" panose="02070309020205020404" pitchFamily="49" charset="0"/>
-              </a:rPr>
-              <a:t>      </a:t>
-            </a:r>
-            <a:r>
-              <a:rPr lang="en-US" b="1" i="1" dirty="0" err="1">
-                <a:solidFill>
-                  <a:srgbClr val="001080"/>
-                </a:solidFill>
-                <a:latin typeface="Courier New" panose="02070309020205020404" pitchFamily="49" charset="0"/>
-                <a:cs typeface="Courier New" panose="02070309020205020404" pitchFamily="49" charset="0"/>
-              </a:rPr>
-              <a:t>res</a:t>
-            </a:r>
-            <a:r>
-              <a:rPr lang="en-US" b="1" i="1" dirty="0" err="1">
-                <a:solidFill>
-                  <a:srgbClr val="000000"/>
-                </a:solidFill>
-                <a:latin typeface="Courier New" panose="02070309020205020404" pitchFamily="49" charset="0"/>
-                <a:cs typeface="Courier New" panose="02070309020205020404" pitchFamily="49" charset="0"/>
-              </a:rPr>
-              <a:t>.</a:t>
-            </a:r>
-            <a:r>
-              <a:rPr lang="en-US" b="1" i="1" dirty="0" err="1">
-                <a:solidFill>
-                  <a:srgbClr val="795E26"/>
-                </a:solidFill>
-                <a:latin typeface="Courier New" panose="02070309020205020404" pitchFamily="49" charset="0"/>
-                <a:cs typeface="Courier New" panose="02070309020205020404" pitchFamily="49" charset="0"/>
-              </a:rPr>
-              <a:t>status</a:t>
-            </a:r>
-            <a:r>
-              <a:rPr lang="en-US" b="1" i="1" dirty="0">
-                <a:solidFill>
-                  <a:srgbClr val="000000"/>
-                </a:solidFill>
-                <a:latin typeface="Courier New" panose="02070309020205020404" pitchFamily="49" charset="0"/>
-                <a:cs typeface="Courier New" panose="02070309020205020404" pitchFamily="49" charset="0"/>
-              </a:rPr>
-              <a:t>(</a:t>
-            </a:r>
-            <a:r>
-              <a:rPr lang="en-US" b="1" i="1" dirty="0">
-                <a:solidFill>
-                  <a:srgbClr val="09885A"/>
-                </a:solidFill>
-                <a:latin typeface="Courier New" panose="02070309020205020404" pitchFamily="49" charset="0"/>
-                <a:cs typeface="Courier New" panose="02070309020205020404" pitchFamily="49" charset="0"/>
-              </a:rPr>
-              <a:t>500</a:t>
-            </a:r>
-            <a:r>
-              <a:rPr lang="en-US" b="1" i="1" dirty="0">
-                <a:solidFill>
-                  <a:srgbClr val="000000"/>
-                </a:solidFill>
-                <a:latin typeface="Courier New" panose="02070309020205020404" pitchFamily="49" charset="0"/>
-                <a:cs typeface="Courier New" panose="02070309020205020404" pitchFamily="49" charset="0"/>
-              </a:rPr>
-              <a:t>).</a:t>
-            </a:r>
-            <a:r>
-              <a:rPr lang="en-US" b="1" i="1" dirty="0">
-                <a:solidFill>
-                  <a:srgbClr val="795E26"/>
-                </a:solidFill>
-                <a:latin typeface="Courier New" panose="02070309020205020404" pitchFamily="49" charset="0"/>
-                <a:cs typeface="Courier New" panose="02070309020205020404" pitchFamily="49" charset="0"/>
-              </a:rPr>
-              <a:t>json</a:t>
-            </a:r>
-            <a:r>
-              <a:rPr lang="en-US" b="1" i="1" dirty="0">
-                <a:solidFill>
-                  <a:srgbClr val="000000"/>
-                </a:solidFill>
-                <a:latin typeface="Courier New" panose="02070309020205020404" pitchFamily="49" charset="0"/>
-                <a:cs typeface="Courier New" panose="02070309020205020404" pitchFamily="49" charset="0"/>
-              </a:rPr>
-              <a:t>({</a:t>
-            </a:r>
-            <a:r>
-              <a:rPr lang="en-US" b="1" i="1" dirty="0">
-                <a:solidFill>
-                  <a:srgbClr val="001080"/>
-                </a:solidFill>
-                <a:latin typeface="Courier New" panose="02070309020205020404" pitchFamily="49" charset="0"/>
-                <a:cs typeface="Courier New" panose="02070309020205020404" pitchFamily="49" charset="0"/>
-              </a:rPr>
-              <a:t>error:</a:t>
-            </a:r>
-            <a:r>
-              <a:rPr lang="en-US" b="1" i="1" dirty="0">
-                <a:solidFill>
-                  <a:srgbClr val="000000"/>
-                </a:solidFill>
-                <a:latin typeface="Courier New" panose="02070309020205020404" pitchFamily="49" charset="0"/>
-                <a:cs typeface="Courier New" panose="02070309020205020404" pitchFamily="49" charset="0"/>
-              </a:rPr>
-              <a:t> </a:t>
-            </a:r>
-            <a:r>
-              <a:rPr lang="en-US" b="1" i="1" dirty="0">
-                <a:solidFill>
-                  <a:srgbClr val="001080"/>
-                </a:solidFill>
-                <a:latin typeface="Courier New" panose="02070309020205020404" pitchFamily="49" charset="0"/>
-                <a:cs typeface="Courier New" panose="02070309020205020404" pitchFamily="49" charset="0"/>
-              </a:rPr>
-              <a:t>e</a:t>
-            </a:r>
-            <a:r>
-              <a:rPr lang="en-US" b="1" i="1" dirty="0">
-                <a:solidFill>
-                  <a:srgbClr val="000000"/>
-                </a:solidFill>
-                <a:latin typeface="Courier New" panose="02070309020205020404" pitchFamily="49" charset="0"/>
-                <a:cs typeface="Courier New" panose="02070309020205020404" pitchFamily="49" charset="0"/>
-              </a:rPr>
-              <a:t>});</a:t>
-            </a:r>
-          </a:p>
-          <a:p>
-            <a:pPr marL="0" indent="0">
-              <a:spcAft>
-                <a:spcPts val="0"/>
-              </a:spcAft>
-              <a:buNone/>
-            </a:pPr>
-            <a:r>
-              <a:rPr lang="en-US" b="1" i="1" dirty="0">
-                <a:solidFill>
-                  <a:srgbClr val="000000"/>
-                </a:solidFill>
-                <a:latin typeface="Courier New" panose="02070309020205020404" pitchFamily="49" charset="0"/>
-                <a:cs typeface="Courier New" panose="02070309020205020404" pitchFamily="49" charset="0"/>
-              </a:rPr>
-              <a:t>  }</a:t>
-            </a:r>
-          </a:p>
-          <a:p>
-            <a:pPr marL="0" indent="0">
-              <a:spcAft>
-                <a:spcPts val="0"/>
-              </a:spcAft>
-              <a:buNone/>
-            </a:pPr>
-            <a:r>
-              <a:rPr lang="en-US" b="1" i="1" dirty="0">
-                <a:solidFill>
-                  <a:srgbClr val="000000"/>
-                </a:solidFill>
-                <a:latin typeface="Courier New" panose="02070309020205020404" pitchFamily="49" charset="0"/>
-                <a:cs typeface="Courier New" panose="02070309020205020404" pitchFamily="49" charset="0"/>
-              </a:rPr>
-              <a:t>});</a:t>
-            </a:r>
-          </a:p>
         </p:txBody>
       </p:sp>
       <p:sp>
@@ -29972,6 +29067,42 @@
           </a:p>
         </p:txBody>
       </p:sp>
+      <p:pic>
+        <p:nvPicPr>
+          <p:cNvPr id="6" name="Picture 5" descr="A screenshot of a cell phone&#10;&#10;Description automatically generated">
+            <a:extLst>
+              <a:ext uri="{FF2B5EF4-FFF2-40B4-BE49-F238E27FC236}">
+                <a16:creationId xmlns:a16="http://schemas.microsoft.com/office/drawing/2014/main" id="{1BAC6FF7-3484-FF4B-870E-9480D9B9A8C4}"/>
+              </a:ext>
+            </a:extLst>
+          </p:cNvPr>
+          <p:cNvPicPr>
+            <a:picLocks noChangeAspect="1"/>
+          </p:cNvPicPr>
+          <p:nvPr/>
+        </p:nvPicPr>
+        <p:blipFill>
+          <a:blip r:embed="rId2">
+            <a:extLst>
+              <a:ext uri="{28A0092B-C50C-407E-A947-70E740481C1C}">
+                <a14:useLocalDpi xmlns:a14="http://schemas.microsoft.com/office/drawing/2010/main" val="0"/>
+              </a:ext>
+            </a:extLst>
+          </a:blip>
+          <a:stretch>
+            <a:fillRect/>
+          </a:stretch>
+        </p:blipFill>
+        <p:spPr>
+          <a:xfrm>
+            <a:off x="2375852" y="1976374"/>
+            <a:ext cx="7162800" cy="3289300"/>
+          </a:xfrm>
+          <a:prstGeom prst="rect">
+            <a:avLst/>
+          </a:prstGeom>
+        </p:spPr>
+      </p:pic>
     </p:spTree>
     <p:extLst>
       <p:ext uri="{BB962C8B-B14F-4D97-AF65-F5344CB8AC3E}">

</xml_diff>